<commit_message>
chkpt for cms slides v1
</commit_message>
<xml_diff>
--- a/slides/cms-demo-v0.pptx
+++ b/slides/cms-demo-v0.pptx
@@ -5,16 +5,17 @@
     <p:sldMasterId id="2147483648" r:id="rId1"/>
   </p:sldMasterIdLst>
   <p:notesMasterIdLst>
-    <p:notesMasterId r:id="rId9"/>
+    <p:notesMasterId r:id="rId10"/>
   </p:notesMasterIdLst>
   <p:sldIdLst>
     <p:sldId id="262" r:id="rId2"/>
     <p:sldId id="258" r:id="rId3"/>
     <p:sldId id="264" r:id="rId4"/>
-    <p:sldId id="259" r:id="rId5"/>
-    <p:sldId id="257" r:id="rId6"/>
-    <p:sldId id="260" r:id="rId7"/>
-    <p:sldId id="261" r:id="rId8"/>
+    <p:sldId id="265" r:id="rId5"/>
+    <p:sldId id="259" r:id="rId6"/>
+    <p:sldId id="257" r:id="rId7"/>
+    <p:sldId id="260" r:id="rId8"/>
+    <p:sldId id="261" r:id="rId9"/>
   </p:sldIdLst>
   <p:sldSz cx="12192000" cy="6858000"/>
   <p:notesSz cx="6858000" cy="9144000"/>
@@ -203,7 +204,7 @@
           <a:p>
             <a:fld id="{E3E45DF1-CECB-1E40-91F0-C10778717205}" type="datetimeFigureOut">
               <a:rPr lang="en-US" smtClean="0"/>
-              <a:t>11/10/2016</a:t>
+              <a:t>11/11/16</a:t>
             </a:fld>
             <a:endParaRPr lang="en-US"/>
           </a:p>
@@ -535,7 +536,7 @@
           <a:p>
             <a:fld id="{944A6B44-1E9C-2545-8E07-1DC035330460}" type="slidenum">
               <a:rPr lang="en-US" smtClean="0"/>
-              <a:t>5</a:t>
+              <a:t>6</a:t>
             </a:fld>
             <a:endParaRPr lang="en-US"/>
           </a:p>
@@ -619,7 +620,7 @@
           <a:p>
             <a:fld id="{944A6B44-1E9C-2545-8E07-1DC035330460}" type="slidenum">
               <a:rPr lang="en-US" smtClean="0"/>
-              <a:t>6</a:t>
+              <a:t>7</a:t>
             </a:fld>
             <a:endParaRPr lang="en-US"/>
           </a:p>
@@ -767,7 +768,7 @@
           <a:p>
             <a:fld id="{248163CF-BA54-D549-9D5C-B7FFE81D7A99}" type="datetimeFigureOut">
               <a:rPr lang="en-US" smtClean="0"/>
-              <a:t>11/10/2016</a:t>
+              <a:t>11/11/16</a:t>
             </a:fld>
             <a:endParaRPr lang="en-US"/>
           </a:p>
@@ -935,7 +936,7 @@
           <a:p>
             <a:fld id="{248163CF-BA54-D549-9D5C-B7FFE81D7A99}" type="datetimeFigureOut">
               <a:rPr lang="en-US" smtClean="0"/>
-              <a:t>11/10/2016</a:t>
+              <a:t>11/11/16</a:t>
             </a:fld>
             <a:endParaRPr lang="en-US"/>
           </a:p>
@@ -1113,7 +1114,7 @@
           <a:p>
             <a:fld id="{248163CF-BA54-D549-9D5C-B7FFE81D7A99}" type="datetimeFigureOut">
               <a:rPr lang="en-US" smtClean="0"/>
-              <a:t>11/10/2016</a:t>
+              <a:t>11/11/16</a:t>
             </a:fld>
             <a:endParaRPr lang="en-US"/>
           </a:p>
@@ -1281,7 +1282,7 @@
           <a:p>
             <a:fld id="{248163CF-BA54-D549-9D5C-B7FFE81D7A99}" type="datetimeFigureOut">
               <a:rPr lang="en-US" smtClean="0"/>
-              <a:t>11/10/2016</a:t>
+              <a:t>11/11/16</a:t>
             </a:fld>
             <a:endParaRPr lang="en-US"/>
           </a:p>
@@ -1526,7 +1527,7 @@
           <a:p>
             <a:fld id="{248163CF-BA54-D549-9D5C-B7FFE81D7A99}" type="datetimeFigureOut">
               <a:rPr lang="en-US" smtClean="0"/>
-              <a:t>11/10/2016</a:t>
+              <a:t>11/11/16</a:t>
             </a:fld>
             <a:endParaRPr lang="en-US"/>
           </a:p>
@@ -1755,7 +1756,7 @@
           <a:p>
             <a:fld id="{248163CF-BA54-D549-9D5C-B7FFE81D7A99}" type="datetimeFigureOut">
               <a:rPr lang="en-US" smtClean="0"/>
-              <a:t>11/10/2016</a:t>
+              <a:t>11/11/16</a:t>
             </a:fld>
             <a:endParaRPr lang="en-US"/>
           </a:p>
@@ -2119,7 +2120,7 @@
           <a:p>
             <a:fld id="{248163CF-BA54-D549-9D5C-B7FFE81D7A99}" type="datetimeFigureOut">
               <a:rPr lang="en-US" smtClean="0"/>
-              <a:t>11/10/2016</a:t>
+              <a:t>11/11/16</a:t>
             </a:fld>
             <a:endParaRPr lang="en-US"/>
           </a:p>
@@ -2236,7 +2237,7 @@
           <a:p>
             <a:fld id="{248163CF-BA54-D549-9D5C-B7FFE81D7A99}" type="datetimeFigureOut">
               <a:rPr lang="en-US" smtClean="0"/>
-              <a:t>11/10/2016</a:t>
+              <a:t>11/11/16</a:t>
             </a:fld>
             <a:endParaRPr lang="en-US"/>
           </a:p>
@@ -2331,7 +2332,7 @@
           <a:p>
             <a:fld id="{248163CF-BA54-D549-9D5C-B7FFE81D7A99}" type="datetimeFigureOut">
               <a:rPr lang="en-US" smtClean="0"/>
-              <a:t>11/10/2016</a:t>
+              <a:t>11/11/16</a:t>
             </a:fld>
             <a:endParaRPr lang="en-US"/>
           </a:p>
@@ -2606,7 +2607,7 @@
           <a:p>
             <a:fld id="{248163CF-BA54-D549-9D5C-B7FFE81D7A99}" type="datetimeFigureOut">
               <a:rPr lang="en-US" smtClean="0"/>
-              <a:t>11/10/2016</a:t>
+              <a:t>11/11/16</a:t>
             </a:fld>
             <a:endParaRPr lang="en-US"/>
           </a:p>
@@ -2858,7 +2859,7 @@
           <a:p>
             <a:fld id="{248163CF-BA54-D549-9D5C-B7FFE81D7A99}" type="datetimeFigureOut">
               <a:rPr lang="en-US" smtClean="0"/>
-              <a:t>11/10/2016</a:t>
+              <a:t>11/11/16</a:t>
             </a:fld>
             <a:endParaRPr lang="en-US"/>
           </a:p>
@@ -3069,7 +3070,7 @@
           <a:p>
             <a:fld id="{248163CF-BA54-D549-9D5C-B7FFE81D7A99}" type="datetimeFigureOut">
               <a:rPr lang="en-US" smtClean="0"/>
-              <a:t>11/10/2016</a:t>
+              <a:t>11/11/16</a:t>
             </a:fld>
             <a:endParaRPr lang="en-US"/>
           </a:p>
@@ -5971,8 +5972,8 @@
         </p:nvSpPr>
         <p:spPr>
           <a:xfrm>
-            <a:off x="2786497" y="65027"/>
-            <a:ext cx="7217297" cy="584775"/>
+            <a:off x="1252463" y="31883"/>
+            <a:ext cx="10127388" cy="584775"/>
           </a:xfrm>
           <a:prstGeom prst="rect">
             <a:avLst/>
@@ -5993,12 +5994,28 @@
               <a:t>: </a:t>
             </a:r>
             <a:r>
-              <a:rPr lang="en-GB" sz="3200" dirty="0" err="1"/>
-              <a:t>EXAscale</a:t>
-            </a:r>
-            <a:r>
               <a:rPr lang="en-GB" sz="3200" dirty="0"/>
-              <a:t> Data Transfer Orchestrator</a:t>
+              <a:t>Software </a:t>
+            </a:r>
+            <a:r>
+              <a:rPr lang="en-GB" sz="3200" dirty="0" smtClean="0"/>
+              <a:t>Defined </a:t>
+            </a:r>
+            <a:r>
+              <a:rPr lang="en-GB" sz="3200" dirty="0" err="1" smtClean="0"/>
+              <a:t>Exascale</a:t>
+            </a:r>
+            <a:r>
+              <a:rPr lang="en-GB" sz="3200" dirty="0" smtClean="0"/>
+              <a:t> </a:t>
+            </a:r>
+            <a:r>
+              <a:rPr lang="en-GB" sz="3200" dirty="0"/>
+              <a:t>Data </a:t>
+            </a:r>
+            <a:r>
+              <a:rPr lang="en-GB" sz="3200" dirty="0"/>
+              <a:t>Transfer Orchestrator</a:t>
             </a:r>
           </a:p>
         </p:txBody>
@@ -6549,8 +6566,8 @@
         </p:nvSpPr>
         <p:spPr>
           <a:xfrm>
-            <a:off x="2352544" y="235509"/>
-            <a:ext cx="7217297" cy="584775"/>
+            <a:off x="1074996" y="234941"/>
+            <a:ext cx="10117129" cy="584775"/>
           </a:xfrm>
           <a:prstGeom prst="rect">
             <a:avLst/>
@@ -6571,12 +6588,20 @@
               <a:t>: </a:t>
             </a:r>
             <a:r>
-              <a:rPr lang="en-GB" sz="3200" dirty="0" err="1"/>
-              <a:t>EXAscale</a:t>
+              <a:rPr lang="en-GB" sz="3200" dirty="0" smtClean="0"/>
+              <a:t>Software Defined </a:t>
+            </a:r>
+            <a:r>
+              <a:rPr lang="en-GB" sz="3200" smtClean="0"/>
+              <a:t>Exascale</a:t>
+            </a:r>
+            <a:r>
+              <a:rPr lang="en-GB" sz="3200" dirty="0" smtClean="0"/>
+              <a:t> </a:t>
             </a:r>
             <a:r>
               <a:rPr lang="en-GB" sz="3200" dirty="0"/>
-              <a:t> Data Transfer Orchestrator</a:t>
+              <a:t>Data Transfer Orchestrator</a:t>
             </a:r>
           </a:p>
         </p:txBody>
@@ -7693,255 +7718,54 @@
       </p:grpSpPr>
       <p:sp>
         <p:nvSpPr>
-          <p:cNvPr id="2" name="Rectangle 1"/>
-          <p:cNvSpPr/>
-          <p:nvPr/>
-        </p:nvSpPr>
-        <p:spPr>
-          <a:xfrm>
-            <a:off x="190500" y="1219766"/>
-            <a:ext cx="11780520" cy="4708981"/>
-          </a:xfrm>
-          <a:prstGeom prst="rect">
-            <a:avLst/>
-          </a:prstGeom>
-        </p:spPr>
-        <p:txBody>
-          <a:bodyPr wrap="square">
-            <a:spAutoFit/>
-          </a:bodyPr>
-          <a:lstStyle/>
-          <a:p>
-            <a:pPr marL="342900" indent="-342900">
-              <a:buFont typeface="Arial" panose="020B0604020202020204" pitchFamily="34" charset="0"/>
-              <a:buChar char="•"/>
-            </a:pPr>
-            <a:endParaRPr lang="en-GB" sz="2000" dirty="0"/>
-          </a:p>
-          <a:p>
-            <a:pPr marL="342900" indent="-342900">
-              <a:buFont typeface="Arial" panose="020B0604020202020204" pitchFamily="34" charset="0"/>
-              <a:buChar char="•"/>
-            </a:pPr>
-            <a:r>
-              <a:rPr lang="en-GB" sz="2000" b="1" dirty="0"/>
-              <a:t>End-to-end orchestration </a:t>
-            </a:r>
-            <a:r>
-              <a:rPr lang="en-GB" sz="2000" dirty="0"/>
-              <a:t>of data flows involving multiple host groups at different domains,</a:t>
-            </a:r>
-          </a:p>
-          <a:p>
-            <a:pPr marL="800100" lvl="1" indent="-342900">
-              <a:buFont typeface="Arial" panose="020B0604020202020204" pitchFamily="34" charset="0"/>
-              <a:buChar char="•"/>
-            </a:pPr>
-            <a:r>
-              <a:rPr lang="en-GB" sz="2000" b="1" dirty="0" err="1"/>
-              <a:t>RESTFul</a:t>
-            </a:r>
-            <a:r>
-              <a:rPr lang="en-GB" sz="2000" b="1" dirty="0"/>
-              <a:t>-API: </a:t>
-            </a:r>
-            <a:r>
-              <a:rPr lang="en-GB" sz="2000" dirty="0"/>
-              <a:t>allow users submit and manage transfer request through different interface</a:t>
-            </a:r>
-          </a:p>
-          <a:p>
-            <a:pPr marL="800100" lvl="1" indent="-342900">
-              <a:buFont typeface="Arial" panose="020B0604020202020204" pitchFamily="34" charset="0"/>
-              <a:buChar char="•"/>
-            </a:pPr>
-            <a:r>
-              <a:rPr lang="en-GB" sz="2000" b="1" dirty="0"/>
-              <a:t>ALTO: </a:t>
-            </a:r>
-            <a:r>
-              <a:rPr lang="en-GB" sz="2000" dirty="0"/>
-              <a:t>collect minimal, real-time network information from different domains</a:t>
-            </a:r>
-          </a:p>
-          <a:p>
-            <a:pPr marL="800100" lvl="1" indent="-342900">
-              <a:buFont typeface="Arial" panose="020B0604020202020204" pitchFamily="34" charset="0"/>
-              <a:buChar char="•"/>
-            </a:pPr>
-            <a:r>
-              <a:rPr lang="en-GB" sz="2000" b="1" dirty="0" err="1"/>
-              <a:t>ExaO</a:t>
-            </a:r>
-            <a:r>
-              <a:rPr lang="en-GB" sz="2000" b="1" dirty="0"/>
-              <a:t> Scheduler: </a:t>
-            </a:r>
-            <a:r>
-              <a:rPr lang="en-GB" sz="2000" dirty="0"/>
-              <a:t>centralized, efficient file-level source and rate co-scheduling </a:t>
-            </a:r>
-          </a:p>
-          <a:p>
-            <a:pPr marL="800100" lvl="1" indent="-342900">
-              <a:buFont typeface="Arial" panose="020B0604020202020204" pitchFamily="34" charset="0"/>
-              <a:buChar char="•"/>
-            </a:pPr>
-            <a:r>
-              <a:rPr lang="en-GB" sz="2000" b="1" dirty="0"/>
-              <a:t>FDT: </a:t>
-            </a:r>
-            <a:r>
-              <a:rPr lang="en-GB" sz="2000" dirty="0"/>
-              <a:t>efficient data transfer tools on end hosts</a:t>
-            </a:r>
-          </a:p>
-          <a:p>
-            <a:pPr marL="800100" lvl="1" indent="-342900">
-              <a:buFont typeface="Arial" panose="020B0604020202020204" pitchFamily="34" charset="0"/>
-              <a:buChar char="•"/>
-            </a:pPr>
-            <a:r>
-              <a:rPr lang="en-GB" sz="2000" b="1" dirty="0" err="1"/>
-              <a:t>Monalisa</a:t>
-            </a:r>
-            <a:r>
-              <a:rPr lang="en-GB" sz="2000" b="1" dirty="0"/>
-              <a:t>: </a:t>
-            </a:r>
-            <a:r>
-              <a:rPr lang="en-GB" sz="2000" dirty="0"/>
-              <a:t>Distributed monitoring infrastructure for real time monitoring each flow, transfer</a:t>
-            </a:r>
-          </a:p>
-          <a:p>
-            <a:pPr marL="342900" indent="-342900">
-              <a:buFont typeface="Arial" panose="020B0604020202020204" pitchFamily="34" charset="0"/>
-              <a:buChar char="•"/>
-            </a:pPr>
-            <a:endParaRPr lang="en-GB" sz="2000" dirty="0"/>
-          </a:p>
-          <a:p>
-            <a:pPr marL="342900" indent="-342900">
-              <a:buFont typeface="Arial" panose="020B0604020202020204" pitchFamily="34" charset="0"/>
-              <a:buChar char="•"/>
-            </a:pPr>
-            <a:r>
-              <a:rPr lang="en-GB" sz="2000" dirty="0"/>
-              <a:t>Minimally invasive change on end host groups</a:t>
-            </a:r>
-          </a:p>
-          <a:p>
-            <a:pPr marL="342900" indent="-342900">
-              <a:buFont typeface="Arial" panose="020B0604020202020204" pitchFamily="34" charset="0"/>
-              <a:buChar char="•"/>
-            </a:pPr>
-            <a:r>
-              <a:rPr lang="en-GB" sz="2000" dirty="0"/>
-              <a:t>Real-time, dynamic resource allocation under the existence of other network traffic</a:t>
-            </a:r>
-          </a:p>
-          <a:p>
-            <a:pPr marL="342900" indent="-342900">
-              <a:buFont typeface="Arial" panose="020B0604020202020204" pitchFamily="34" charset="0"/>
-              <a:buChar char="•"/>
-            </a:pPr>
-            <a:r>
-              <a:rPr lang="en-GB" sz="2000" b="1" dirty="0"/>
-              <a:t>Not CMS or HEP specific, </a:t>
-            </a:r>
-            <a:r>
-              <a:rPr lang="en-GB" sz="2000" dirty="0"/>
-              <a:t>hence support any data intensive sciences.</a:t>
-            </a:r>
-          </a:p>
-          <a:p>
-            <a:pPr marL="342900" indent="-342900">
-              <a:buFont typeface="Arial" panose="020B0604020202020204" pitchFamily="34" charset="0"/>
-              <a:buChar char="•"/>
-            </a:pPr>
-            <a:endParaRPr lang="en-GB" sz="2000" dirty="0"/>
-          </a:p>
-          <a:p>
-            <a:pPr marL="342900" indent="-342900">
-              <a:buFont typeface="Arial" panose="020B0604020202020204" pitchFamily="34" charset="0"/>
-              <a:buChar char="•"/>
-            </a:pPr>
-            <a:r>
-              <a:rPr lang="en-GB" sz="2000" dirty="0"/>
-              <a:t>Dataset distribution to N destination sites with M candidate source sites:</a:t>
-            </a:r>
-          </a:p>
-          <a:p>
-            <a:pPr marL="800100" lvl="1" indent="-342900">
-              <a:buFont typeface="Arial" panose="020B0604020202020204" pitchFamily="34" charset="0"/>
-              <a:buChar char="•"/>
-            </a:pPr>
-            <a:r>
-              <a:rPr lang="en-GB" sz="2000" b="1" dirty="0"/>
-              <a:t>Maximal link utilization </a:t>
-            </a:r>
-            <a:r>
-              <a:rPr lang="en-GB" sz="2000" dirty="0"/>
-              <a:t>in the testbed</a:t>
-            </a:r>
-          </a:p>
-          <a:p>
-            <a:pPr marL="800100" lvl="1" indent="-342900">
-              <a:buFont typeface="Arial" panose="020B0604020202020204" pitchFamily="34" charset="0"/>
-              <a:buChar char="•"/>
-            </a:pPr>
-            <a:r>
-              <a:rPr lang="en-GB" sz="2000" b="1" dirty="0"/>
-              <a:t>N/M times faster than dataset level scheduling </a:t>
-            </a:r>
-          </a:p>
-        </p:txBody>
-      </p:sp>
-      <p:sp>
-        <p:nvSpPr>
-          <p:cNvPr id="55" name="Rectangle 54"/>
-          <p:cNvSpPr/>
-          <p:nvPr/>
-        </p:nvSpPr>
-        <p:spPr>
-          <a:xfrm>
-            <a:off x="2786497" y="65027"/>
-            <a:ext cx="7217297" cy="584775"/>
-          </a:xfrm>
-          <a:prstGeom prst="rect">
-            <a:avLst/>
-          </a:prstGeom>
-        </p:spPr>
-        <p:txBody>
-          <a:bodyPr wrap="none">
-            <a:spAutoFit/>
-          </a:bodyPr>
-          <a:lstStyle/>
-          <a:p>
-            <a:r>
-              <a:rPr lang="en-GB" sz="3200" dirty="0" err="1"/>
-              <a:t>ExaO</a:t>
-            </a:r>
-            <a:r>
-              <a:rPr lang="en-GB" sz="3200" dirty="0"/>
-              <a:t>: </a:t>
-            </a:r>
-            <a:r>
-              <a:rPr lang="en-GB" sz="3200" dirty="0" err="1"/>
-              <a:t>EXAscale</a:t>
-            </a:r>
-            <a:r>
-              <a:rPr lang="en-GB" sz="3200" dirty="0"/>
-              <a:t> Data Transfer Orchestrator</a:t>
-            </a:r>
+          <p:cNvPr id="2" name="Title 1"/>
+          <p:cNvSpPr>
+            <a:spLocks noGrp="1"/>
+          </p:cNvSpPr>
+          <p:nvPr>
+            <p:ph type="title"/>
+          </p:nvPr>
+        </p:nvSpPr>
+        <p:spPr/>
+        <p:txBody>
+          <a:bodyPr/>
+          <a:lstStyle/>
+          <a:p>
+            <a:r>
+              <a:rPr lang="en-US" dirty="0" smtClean="0"/>
+              <a:t>Software Defined Data Transfer</a:t>
+            </a:r>
+            <a:endParaRPr lang="en-US" dirty="0"/>
+          </a:p>
+        </p:txBody>
+      </p:sp>
+      <p:sp>
+        <p:nvSpPr>
+          <p:cNvPr id="3" name="Content Placeholder 2"/>
+          <p:cNvSpPr>
+            <a:spLocks noGrp="1"/>
+          </p:cNvSpPr>
+          <p:nvPr>
+            <p:ph idx="1"/>
+          </p:nvPr>
+        </p:nvSpPr>
+        <p:spPr/>
+        <p:txBody>
+          <a:bodyPr/>
+          <a:lstStyle/>
+          <a:p>
+            <a:r>
+              <a:rPr lang="en-US" altLang="zh-CN" dirty="0" smtClean="0"/>
+              <a:t>S</a:t>
+            </a:r>
+            <a:endParaRPr lang="en-US" dirty="0"/>
           </a:p>
         </p:txBody>
       </p:sp>
     </p:spTree>
     <p:extLst>
       <p:ext uri="{BB962C8B-B14F-4D97-AF65-F5344CB8AC3E}">
-        <p14:creationId xmlns:p14="http://schemas.microsoft.com/office/powerpoint/2010/main" val="934554512"/>
+        <p14:creationId xmlns:p14="http://schemas.microsoft.com/office/powerpoint/2010/main" val="354908524"/>
       </p:ext>
     </p:extLst>
   </p:cSld>
@@ -7970,85 +7794,255 @@
       </p:grpSpPr>
       <p:sp>
         <p:nvSpPr>
-          <p:cNvPr id="68" name="Rectangle 67"/>
+          <p:cNvPr id="2" name="Rectangle 1"/>
           <p:cNvSpPr/>
           <p:nvPr/>
         </p:nvSpPr>
         <p:spPr>
           <a:xfrm>
-            <a:off x="491253" y="186361"/>
-            <a:ext cx="5553956" cy="584775"/>
+            <a:off x="190500" y="1219766"/>
+            <a:ext cx="11780520" cy="4708981"/>
           </a:xfrm>
           <a:prstGeom prst="rect">
             <a:avLst/>
           </a:prstGeom>
         </p:spPr>
         <p:txBody>
+          <a:bodyPr wrap="square">
+            <a:spAutoFit/>
+          </a:bodyPr>
+          <a:lstStyle/>
+          <a:p>
+            <a:pPr marL="342900" indent="-342900">
+              <a:buFont typeface="Arial" panose="020B0604020202020204" pitchFamily="34" charset="0"/>
+              <a:buChar char="•"/>
+            </a:pPr>
+            <a:endParaRPr lang="en-GB" sz="2000" dirty="0"/>
+          </a:p>
+          <a:p>
+            <a:pPr marL="342900" indent="-342900">
+              <a:buFont typeface="Arial" panose="020B0604020202020204" pitchFamily="34" charset="0"/>
+              <a:buChar char="•"/>
+            </a:pPr>
+            <a:r>
+              <a:rPr lang="en-GB" sz="2000" b="1" dirty="0"/>
+              <a:t>End-to-end orchestration </a:t>
+            </a:r>
+            <a:r>
+              <a:rPr lang="en-GB" sz="2000" dirty="0"/>
+              <a:t>of data flows involving multiple host groups at different domains,</a:t>
+            </a:r>
+          </a:p>
+          <a:p>
+            <a:pPr marL="800100" lvl="1" indent="-342900">
+              <a:buFont typeface="Arial" panose="020B0604020202020204" pitchFamily="34" charset="0"/>
+              <a:buChar char="•"/>
+            </a:pPr>
+            <a:r>
+              <a:rPr lang="en-GB" sz="2000" b="1" dirty="0" err="1"/>
+              <a:t>RESTFul</a:t>
+            </a:r>
+            <a:r>
+              <a:rPr lang="en-GB" sz="2000" b="1" dirty="0"/>
+              <a:t>-API: </a:t>
+            </a:r>
+            <a:r>
+              <a:rPr lang="en-GB" sz="2000" dirty="0"/>
+              <a:t>allow users submit and manage transfer request through different interface</a:t>
+            </a:r>
+          </a:p>
+          <a:p>
+            <a:pPr marL="800100" lvl="1" indent="-342900">
+              <a:buFont typeface="Arial" panose="020B0604020202020204" pitchFamily="34" charset="0"/>
+              <a:buChar char="•"/>
+            </a:pPr>
+            <a:r>
+              <a:rPr lang="en-GB" sz="2000" b="1" dirty="0"/>
+              <a:t>ALTO: </a:t>
+            </a:r>
+            <a:r>
+              <a:rPr lang="en-GB" sz="2000" dirty="0"/>
+              <a:t>collect minimal, real-time network information from different domains</a:t>
+            </a:r>
+          </a:p>
+          <a:p>
+            <a:pPr marL="800100" lvl="1" indent="-342900">
+              <a:buFont typeface="Arial" panose="020B0604020202020204" pitchFamily="34" charset="0"/>
+              <a:buChar char="•"/>
+            </a:pPr>
+            <a:r>
+              <a:rPr lang="en-GB" sz="2000" b="1" dirty="0" err="1"/>
+              <a:t>ExaO</a:t>
+            </a:r>
+            <a:r>
+              <a:rPr lang="en-GB" sz="2000" b="1" dirty="0"/>
+              <a:t> Scheduler: </a:t>
+            </a:r>
+            <a:r>
+              <a:rPr lang="en-GB" sz="2000" dirty="0"/>
+              <a:t>centralized, efficient file-level source and rate co-scheduling </a:t>
+            </a:r>
+          </a:p>
+          <a:p>
+            <a:pPr marL="800100" lvl="1" indent="-342900">
+              <a:buFont typeface="Arial" panose="020B0604020202020204" pitchFamily="34" charset="0"/>
+              <a:buChar char="•"/>
+            </a:pPr>
+            <a:r>
+              <a:rPr lang="en-GB" sz="2000" b="1" dirty="0"/>
+              <a:t>FDT: </a:t>
+            </a:r>
+            <a:r>
+              <a:rPr lang="en-GB" sz="2000" dirty="0"/>
+              <a:t>efficient data transfer tools on end hosts</a:t>
+            </a:r>
+          </a:p>
+          <a:p>
+            <a:pPr marL="800100" lvl="1" indent="-342900">
+              <a:buFont typeface="Arial" panose="020B0604020202020204" pitchFamily="34" charset="0"/>
+              <a:buChar char="•"/>
+            </a:pPr>
+            <a:r>
+              <a:rPr lang="en-GB" sz="2000" b="1" dirty="0" err="1"/>
+              <a:t>Monalisa</a:t>
+            </a:r>
+            <a:r>
+              <a:rPr lang="en-GB" sz="2000" b="1" dirty="0"/>
+              <a:t>: </a:t>
+            </a:r>
+            <a:r>
+              <a:rPr lang="en-GB" sz="2000" dirty="0"/>
+              <a:t>Distributed monitoring infrastructure for real time monitoring each flow, transfer</a:t>
+            </a:r>
+          </a:p>
+          <a:p>
+            <a:pPr marL="342900" indent="-342900">
+              <a:buFont typeface="Arial" panose="020B0604020202020204" pitchFamily="34" charset="0"/>
+              <a:buChar char="•"/>
+            </a:pPr>
+            <a:endParaRPr lang="en-GB" sz="2000" dirty="0"/>
+          </a:p>
+          <a:p>
+            <a:pPr marL="342900" indent="-342900">
+              <a:buFont typeface="Arial" panose="020B0604020202020204" pitchFamily="34" charset="0"/>
+              <a:buChar char="•"/>
+            </a:pPr>
+            <a:r>
+              <a:rPr lang="en-GB" sz="2000" dirty="0"/>
+              <a:t>Minimally invasive change on end host groups</a:t>
+            </a:r>
+          </a:p>
+          <a:p>
+            <a:pPr marL="342900" indent="-342900">
+              <a:buFont typeface="Arial" panose="020B0604020202020204" pitchFamily="34" charset="0"/>
+              <a:buChar char="•"/>
+            </a:pPr>
+            <a:r>
+              <a:rPr lang="en-GB" sz="2000" dirty="0"/>
+              <a:t>Real-time, dynamic resource allocation under the existence of other network traffic</a:t>
+            </a:r>
+          </a:p>
+          <a:p>
+            <a:pPr marL="342900" indent="-342900">
+              <a:buFont typeface="Arial" panose="020B0604020202020204" pitchFamily="34" charset="0"/>
+              <a:buChar char="•"/>
+            </a:pPr>
+            <a:r>
+              <a:rPr lang="en-GB" sz="2000" b="1" dirty="0"/>
+              <a:t>Not CMS or HEP specific, </a:t>
+            </a:r>
+            <a:r>
+              <a:rPr lang="en-GB" sz="2000" dirty="0"/>
+              <a:t>hence support any data intensive sciences.</a:t>
+            </a:r>
+          </a:p>
+          <a:p>
+            <a:pPr marL="342900" indent="-342900">
+              <a:buFont typeface="Arial" panose="020B0604020202020204" pitchFamily="34" charset="0"/>
+              <a:buChar char="•"/>
+            </a:pPr>
+            <a:endParaRPr lang="en-GB" sz="2000" dirty="0"/>
+          </a:p>
+          <a:p>
+            <a:pPr marL="342900" indent="-342900">
+              <a:buFont typeface="Arial" panose="020B0604020202020204" pitchFamily="34" charset="0"/>
+              <a:buChar char="•"/>
+            </a:pPr>
+            <a:r>
+              <a:rPr lang="en-GB" sz="2000" dirty="0"/>
+              <a:t>Dataset distribution to N destination sites with M candidate source sites:</a:t>
+            </a:r>
+          </a:p>
+          <a:p>
+            <a:pPr marL="800100" lvl="1" indent="-342900">
+              <a:buFont typeface="Arial" panose="020B0604020202020204" pitchFamily="34" charset="0"/>
+              <a:buChar char="•"/>
+            </a:pPr>
+            <a:r>
+              <a:rPr lang="en-GB" sz="2000" b="1" dirty="0"/>
+              <a:t>Maximal link utilization </a:t>
+            </a:r>
+            <a:r>
+              <a:rPr lang="en-GB" sz="2000" dirty="0"/>
+              <a:t>in the testbed</a:t>
+            </a:r>
+          </a:p>
+          <a:p>
+            <a:pPr marL="800100" lvl="1" indent="-342900">
+              <a:buFont typeface="Arial" panose="020B0604020202020204" pitchFamily="34" charset="0"/>
+              <a:buChar char="•"/>
+            </a:pPr>
+            <a:r>
+              <a:rPr lang="en-GB" sz="2000" b="1" dirty="0"/>
+              <a:t>N/M times faster than dataset level scheduling </a:t>
+            </a:r>
+          </a:p>
+        </p:txBody>
+      </p:sp>
+      <p:sp>
+        <p:nvSpPr>
+          <p:cNvPr id="55" name="Rectangle 54"/>
+          <p:cNvSpPr/>
+          <p:nvPr/>
+        </p:nvSpPr>
+        <p:spPr>
+          <a:xfrm>
+            <a:off x="2786497" y="65027"/>
+            <a:ext cx="7217297" cy="584775"/>
+          </a:xfrm>
+          <a:prstGeom prst="rect">
+            <a:avLst/>
+          </a:prstGeom>
+        </p:spPr>
+        <p:txBody>
           <a:bodyPr wrap="none">
             <a:spAutoFit/>
           </a:bodyPr>
           <a:lstStyle/>
           <a:p>
             <a:r>
-              <a:rPr lang="en-US" altLang="zh-CN" sz="3200" dirty="0"/>
-              <a:t>Case</a:t>
-            </a:r>
-            <a:r>
-              <a:rPr lang="zh-CN" altLang="en-US" sz="3200" dirty="0"/>
-              <a:t> </a:t>
-            </a:r>
-            <a:r>
-              <a:rPr lang="en-US" altLang="zh-CN" sz="3200" dirty="0"/>
-              <a:t>Study:</a:t>
-            </a:r>
-            <a:r>
-              <a:rPr lang="zh-CN" altLang="en-US" sz="3200" dirty="0"/>
-              <a:t> </a:t>
-            </a:r>
-            <a:r>
-              <a:rPr lang="en-US" altLang="zh-CN" sz="3200" dirty="0"/>
-              <a:t>Dataset</a:t>
-            </a:r>
-            <a:r>
-              <a:rPr lang="zh-CN" altLang="en-US" sz="3200" dirty="0"/>
-              <a:t> </a:t>
-            </a:r>
-            <a:r>
-              <a:rPr lang="en-US" altLang="zh-CN" sz="3200" dirty="0"/>
-              <a:t>Distribution</a:t>
-            </a:r>
-            <a:endParaRPr lang="en-GB" sz="3200" dirty="0"/>
-          </a:p>
-        </p:txBody>
-      </p:sp>
-      <p:pic>
-        <p:nvPicPr>
-          <p:cNvPr id="3" name="Picture 2"/>
-          <p:cNvPicPr>
-            <a:picLocks noChangeAspect="1"/>
-          </p:cNvPicPr>
-          <p:nvPr/>
-        </p:nvPicPr>
-        <p:blipFill>
-          <a:blip r:embed="rId3"/>
-          <a:stretch>
-            <a:fillRect/>
-          </a:stretch>
-        </p:blipFill>
-        <p:spPr>
-          <a:xfrm>
-            <a:off x="866775" y="889286"/>
-            <a:ext cx="10738750" cy="5692490"/>
-          </a:xfrm>
-          <a:prstGeom prst="rect">
-            <a:avLst/>
-          </a:prstGeom>
-        </p:spPr>
-      </p:pic>
+              <a:rPr lang="en-GB" sz="3200" dirty="0" err="1"/>
+              <a:t>ExaO</a:t>
+            </a:r>
+            <a:r>
+              <a:rPr lang="en-GB" sz="3200" dirty="0"/>
+              <a:t>: </a:t>
+            </a:r>
+            <a:r>
+              <a:rPr lang="en-GB" sz="3200" dirty="0" err="1"/>
+              <a:t>EXAscale</a:t>
+            </a:r>
+            <a:r>
+              <a:rPr lang="en-GB" sz="3200" dirty="0"/>
+              <a:t> Data Transfer Orchestrator</a:t>
+            </a:r>
+          </a:p>
+        </p:txBody>
+      </p:sp>
     </p:spTree>
     <p:extLst>
       <p:ext uri="{BB962C8B-B14F-4D97-AF65-F5344CB8AC3E}">
-        <p14:creationId xmlns:p14="http://schemas.microsoft.com/office/powerpoint/2010/main" val="1680627140"/>
+        <p14:creationId xmlns:p14="http://schemas.microsoft.com/office/powerpoint/2010/main" val="934554512"/>
       </p:ext>
     </p:extLst>
   </p:cSld>
@@ -8083,66 +8077,14 @@
         </p:nvSpPr>
         <p:spPr>
           <a:xfrm>
-            <a:off x="400050" y="2800350"/>
-            <a:ext cx="4948855" cy="584775"/>
+            <a:off x="491253" y="186361"/>
+            <a:ext cx="5553956" cy="584775"/>
           </a:xfrm>
           <a:prstGeom prst="rect">
             <a:avLst/>
           </a:prstGeom>
         </p:spPr>
         <p:txBody>
-          <a:bodyPr wrap="none" anchor="t">
-            <a:spAutoFit/>
-          </a:bodyPr>
-          <a:lstStyle/>
-          <a:p>
-            <a:r>
-              <a:rPr lang="EN-US" altLang="ZH-CN" sz="3200" dirty="0"/>
-              <a:t>File-Level</a:t>
-            </a:r>
-            <a:r>
-              <a:rPr lang="ZH-CN" altLang="EN-US" sz="3200" dirty="0"/>
-              <a:t> </a:t>
-            </a:r>
-            <a:r>
-              <a:rPr lang="EN-US" altLang="ZH-CN" sz="3200" dirty="0"/>
-              <a:t>Scheduling</a:t>
-            </a:r>
-            <a:r>
-              <a:rPr lang="ZH-CN" altLang="EN-US" sz="3200" dirty="0"/>
-              <a:t> </a:t>
-            </a:r>
-            <a:r>
-              <a:rPr lang="EN-US" altLang="ZH-CN" sz="3200" dirty="0"/>
-              <a:t>(</a:t>
-            </a:r>
-            <a:r>
-              <a:rPr lang="EN-US" altLang="ZH-CN" sz="3200" dirty="0" err="1"/>
-              <a:t>ExaO</a:t>
-            </a:r>
-            <a:r>
-              <a:rPr lang="EN-US" altLang="ZH-CN" sz="3200" dirty="0"/>
-              <a:t>):</a:t>
-            </a:r>
-          </a:p>
-        </p:txBody>
-      </p:sp>
-      <p:sp>
-        <p:nvSpPr>
-          <p:cNvPr id="76" name="Rectangle 75"/>
-          <p:cNvSpPr/>
-          <p:nvPr/>
-        </p:nvSpPr>
-        <p:spPr>
-          <a:xfrm>
-            <a:off x="359265" y="198371"/>
-            <a:ext cx="6050502" cy="584775"/>
-          </a:xfrm>
-          <a:prstGeom prst="rect">
-            <a:avLst/>
-          </a:prstGeom>
-        </p:spPr>
-        <p:txBody>
           <a:bodyPr wrap="none">
             <a:spAutoFit/>
           </a:bodyPr>
@@ -8150,7 +8092,7 @@
           <a:p>
             <a:r>
               <a:rPr lang="en-US" altLang="zh-CN" sz="3200" dirty="0"/>
-              <a:t>Dataset-Level</a:t>
+              <a:t>Case</a:t>
             </a:r>
             <a:r>
               <a:rPr lang="zh-CN" altLang="en-US" sz="3200" dirty="0"/>
@@ -8158,7 +8100,7 @@
             </a:r>
             <a:r>
               <a:rPr lang="en-US" altLang="zh-CN" sz="3200" dirty="0"/>
-              <a:t>Scheduling</a:t>
+              <a:t>Study:</a:t>
             </a:r>
             <a:r>
               <a:rPr lang="zh-CN" altLang="en-US" sz="3200" dirty="0"/>
@@ -8166,15 +8108,15 @@
             </a:r>
             <a:r>
               <a:rPr lang="en-US" altLang="zh-CN" sz="3200" dirty="0"/>
-              <a:t>(</a:t>
-            </a:r>
-            <a:r>
-              <a:rPr lang="en-US" altLang="zh-CN" sz="3200" dirty="0" err="1"/>
-              <a:t>PhEDEx</a:t>
+              <a:t>Dataset</a:t>
+            </a:r>
+            <a:r>
+              <a:rPr lang="zh-CN" altLang="en-US" sz="3200" dirty="0"/>
+              <a:t> </a:t>
             </a:r>
             <a:r>
               <a:rPr lang="en-US" altLang="zh-CN" sz="3200" dirty="0"/>
-              <a:t>):</a:t>
+              <a:t>Distribution</a:t>
             </a:r>
             <a:endParaRPr lang="en-GB" sz="3200" dirty="0"/>
           </a:p>
@@ -8182,7 +8124,7 @@
       </p:sp>
       <p:pic>
         <p:nvPicPr>
-          <p:cNvPr id="2" name="Picture 1"/>
+          <p:cNvPr id="3" name="Picture 2"/>
           <p:cNvPicPr>
             <a:picLocks noChangeAspect="1"/>
           </p:cNvPicPr>
@@ -8196,153 +8138,18 @@
         </p:blipFill>
         <p:spPr>
           <a:xfrm>
-            <a:off x="904875" y="787843"/>
-            <a:ext cx="7749996" cy="1586249"/>
+            <a:off x="866775" y="889286"/>
+            <a:ext cx="10738750" cy="5692490"/>
           </a:xfrm>
           <a:prstGeom prst="rect">
             <a:avLst/>
           </a:prstGeom>
         </p:spPr>
       </p:pic>
-      <p:sp>
-        <p:nvSpPr>
-          <p:cNvPr id="3" name="TextBox 2"/>
-          <p:cNvSpPr txBox="1"/>
-          <p:nvPr/>
-        </p:nvSpPr>
-        <p:spPr>
-          <a:xfrm>
-            <a:off x="7391400" y="2505075"/>
-            <a:ext cx="3951288" cy="461665"/>
-          </a:xfrm>
-          <a:prstGeom prst="rect">
-            <a:avLst/>
-          </a:prstGeom>
-        </p:spPr>
-        <p:txBody>
-          <a:bodyPr wrap="none" anchor="t">
-            <a:spAutoFit/>
-          </a:bodyPr>
-          <a:lstStyle/>
-          <a:p>
-            <a:r>
-              <a:rPr lang="EN-US" sz="2400" dirty="0"/>
-              <a:t>Link Utilization: 1/7 = 14.29%</a:t>
-            </a:r>
-            <a:endParaRPr lang="en-US" sz="2400" dirty="0"/>
-          </a:p>
-        </p:txBody>
-      </p:sp>
-      <p:sp>
-        <p:nvSpPr>
-          <p:cNvPr id="55" name="TextBox 54"/>
-          <p:cNvSpPr txBox="1"/>
-          <p:nvPr/>
-        </p:nvSpPr>
-        <p:spPr>
-          <a:xfrm>
-            <a:off x="7391401" y="3695700"/>
-            <a:ext cx="3815468" cy="461665"/>
-          </a:xfrm>
-          <a:prstGeom prst="rect">
-            <a:avLst/>
-          </a:prstGeom>
-        </p:spPr>
-        <p:txBody>
-          <a:bodyPr wrap="none" anchor="t">
-            <a:spAutoFit/>
-          </a:bodyPr>
-          <a:lstStyle/>
-          <a:p>
-            <a:r>
-              <a:rPr lang="EN-US" sz="2400" dirty="0"/>
-              <a:t>Link Utilization: 6/7 = 85.71%</a:t>
-            </a:r>
-            <a:endParaRPr lang="en-US" sz="2400" dirty="0"/>
-          </a:p>
-        </p:txBody>
-      </p:sp>
-      <p:pic>
-        <p:nvPicPr>
-          <p:cNvPr id="4" name="Picture 3"/>
-          <p:cNvPicPr>
-            <a:picLocks noChangeAspect="1"/>
-          </p:cNvPicPr>
-          <p:nvPr/>
-        </p:nvPicPr>
-        <p:blipFill>
-          <a:blip r:embed="rId4"/>
-          <a:stretch>
-            <a:fillRect/>
-          </a:stretch>
-        </p:blipFill>
-        <p:spPr>
-          <a:xfrm>
-            <a:off x="262926" y="3581400"/>
-            <a:ext cx="3853463" cy="2720431"/>
-          </a:xfrm>
-          <a:prstGeom prst="rect">
-            <a:avLst/>
-          </a:prstGeom>
-        </p:spPr>
-      </p:pic>
-      <p:pic>
-        <p:nvPicPr>
-          <p:cNvPr id="6" name="Picture 5"/>
-          <p:cNvPicPr>
-            <a:picLocks noChangeAspect="1"/>
-          </p:cNvPicPr>
-          <p:nvPr/>
-        </p:nvPicPr>
-        <p:blipFill>
-          <a:blip r:embed="rId5"/>
-          <a:stretch>
-            <a:fillRect/>
-          </a:stretch>
-        </p:blipFill>
-        <p:spPr>
-          <a:xfrm>
-            <a:off x="4876800" y="3657600"/>
-            <a:ext cx="3733024" cy="2644355"/>
-          </a:xfrm>
-          <a:prstGeom prst="rect">
-            <a:avLst/>
-          </a:prstGeom>
-        </p:spPr>
-      </p:pic>
-      <p:sp>
-        <p:nvSpPr>
-          <p:cNvPr id="57" name="TextBox 56"/>
-          <p:cNvSpPr txBox="1"/>
-          <p:nvPr/>
-        </p:nvSpPr>
-        <p:spPr>
-          <a:xfrm flipH="1">
-            <a:off x="4086225" y="3996055"/>
-            <a:ext cx="1166095" cy="1015663"/>
-          </a:xfrm>
-          <a:prstGeom prst="rect">
-            <a:avLst/>
-          </a:prstGeom>
-        </p:spPr>
-        <p:txBody>
-          <a:bodyPr wrap="square" anchor="t">
-            <a:spAutoFit/>
-          </a:bodyPr>
-          <a:lstStyle/>
-          <a:p>
-            <a:r>
-              <a:rPr lang="EN-US" sz="6000" dirty="0"/>
-              <a:t>...</a:t>
-            </a:r>
-            <a:endParaRPr lang="en-US" sz="6000" dirty="0"/>
-          </a:p>
-        </p:txBody>
-      </p:sp>
     </p:spTree>
     <p:extLst>
       <p:ext uri="{BB962C8B-B14F-4D97-AF65-F5344CB8AC3E}">
-        <p14:creationId xmlns:p14="http://schemas.microsoft.com/office/powerpoint/2010/main" val="1632952188"/>
+        <p14:creationId xmlns:p14="http://schemas.microsoft.com/office/powerpoint/2010/main" val="1680627140"/>
       </p:ext>
     </p:extLst>
   </p:cSld>
@@ -8371,6 +8178,284 @@
       </p:grpSpPr>
       <p:sp>
         <p:nvSpPr>
+          <p:cNvPr id="68" name="Rectangle 67"/>
+          <p:cNvSpPr/>
+          <p:nvPr/>
+        </p:nvSpPr>
+        <p:spPr>
+          <a:xfrm>
+            <a:off x="400050" y="2800350"/>
+            <a:ext cx="4948855" cy="584775"/>
+          </a:xfrm>
+          <a:prstGeom prst="rect">
+            <a:avLst/>
+          </a:prstGeom>
+        </p:spPr>
+        <p:txBody>
+          <a:bodyPr wrap="none" anchor="t">
+            <a:spAutoFit/>
+          </a:bodyPr>
+          <a:lstStyle/>
+          <a:p>
+            <a:r>
+              <a:rPr lang="x-none" altLang="x-none" sz="3200" dirty="0"/>
+              <a:t>File-Level Scheduling (</a:t>
+            </a:r>
+            <a:r>
+              <a:rPr lang="x-none" altLang="x-none" sz="3200" dirty="0" err="1"/>
+              <a:t>ExaO</a:t>
+            </a:r>
+            <a:r>
+              <a:rPr lang="x-none" altLang="x-none" sz="3200" dirty="0"/>
+              <a:t>):</a:t>
+            </a:r>
+          </a:p>
+        </p:txBody>
+      </p:sp>
+      <p:sp>
+        <p:nvSpPr>
+          <p:cNvPr id="76" name="Rectangle 75"/>
+          <p:cNvSpPr/>
+          <p:nvPr/>
+        </p:nvSpPr>
+        <p:spPr>
+          <a:xfrm>
+            <a:off x="359265" y="198371"/>
+            <a:ext cx="6050502" cy="584775"/>
+          </a:xfrm>
+          <a:prstGeom prst="rect">
+            <a:avLst/>
+          </a:prstGeom>
+        </p:spPr>
+        <p:txBody>
+          <a:bodyPr wrap="none">
+            <a:spAutoFit/>
+          </a:bodyPr>
+          <a:lstStyle/>
+          <a:p>
+            <a:r>
+              <a:rPr lang="en-US" altLang="zh-CN" sz="3200" dirty="0"/>
+              <a:t>Dataset-Level</a:t>
+            </a:r>
+            <a:r>
+              <a:rPr lang="zh-CN" altLang="en-US" sz="3200" dirty="0"/>
+              <a:t> </a:t>
+            </a:r>
+            <a:r>
+              <a:rPr lang="en-US" altLang="zh-CN" sz="3200" dirty="0"/>
+              <a:t>Scheduling</a:t>
+            </a:r>
+            <a:r>
+              <a:rPr lang="zh-CN" altLang="en-US" sz="3200" dirty="0"/>
+              <a:t> </a:t>
+            </a:r>
+            <a:r>
+              <a:rPr lang="en-US" altLang="zh-CN" sz="3200" dirty="0"/>
+              <a:t>(</a:t>
+            </a:r>
+            <a:r>
+              <a:rPr lang="en-US" altLang="zh-CN" sz="3200" dirty="0" err="1"/>
+              <a:t>PhEDEx</a:t>
+            </a:r>
+            <a:r>
+              <a:rPr lang="en-US" altLang="zh-CN" sz="3200" dirty="0"/>
+              <a:t>):</a:t>
+            </a:r>
+            <a:endParaRPr lang="en-GB" sz="3200" dirty="0"/>
+          </a:p>
+        </p:txBody>
+      </p:sp>
+      <p:pic>
+        <p:nvPicPr>
+          <p:cNvPr id="2" name="Picture 1"/>
+          <p:cNvPicPr>
+            <a:picLocks noChangeAspect="1"/>
+          </p:cNvPicPr>
+          <p:nvPr/>
+        </p:nvPicPr>
+        <p:blipFill>
+          <a:blip r:embed="rId3"/>
+          <a:stretch>
+            <a:fillRect/>
+          </a:stretch>
+        </p:blipFill>
+        <p:spPr>
+          <a:xfrm>
+            <a:off x="904875" y="787843"/>
+            <a:ext cx="7749996" cy="1586249"/>
+          </a:xfrm>
+          <a:prstGeom prst="rect">
+            <a:avLst/>
+          </a:prstGeom>
+        </p:spPr>
+      </p:pic>
+      <p:sp>
+        <p:nvSpPr>
+          <p:cNvPr id="3" name="TextBox 2"/>
+          <p:cNvSpPr txBox="1"/>
+          <p:nvPr/>
+        </p:nvSpPr>
+        <p:spPr>
+          <a:xfrm>
+            <a:off x="7391400" y="2505075"/>
+            <a:ext cx="3951288" cy="461665"/>
+          </a:xfrm>
+          <a:prstGeom prst="rect">
+            <a:avLst/>
+          </a:prstGeom>
+        </p:spPr>
+        <p:txBody>
+          <a:bodyPr wrap="none" anchor="t">
+            <a:spAutoFit/>
+          </a:bodyPr>
+          <a:lstStyle/>
+          <a:p>
+            <a:r>
+              <a:rPr lang="x-none" sz="2400" dirty="0"/>
+              <a:t>Link Utilization: 1/7 = 14.29%</a:t>
+            </a:r>
+            <a:endParaRPr lang="en-US" sz="2400" dirty="0"/>
+          </a:p>
+        </p:txBody>
+      </p:sp>
+      <p:sp>
+        <p:nvSpPr>
+          <p:cNvPr id="55" name="TextBox 54"/>
+          <p:cNvSpPr txBox="1"/>
+          <p:nvPr/>
+        </p:nvSpPr>
+        <p:spPr>
+          <a:xfrm>
+            <a:off x="7391401" y="3695700"/>
+            <a:ext cx="3815468" cy="461665"/>
+          </a:xfrm>
+          <a:prstGeom prst="rect">
+            <a:avLst/>
+          </a:prstGeom>
+        </p:spPr>
+        <p:txBody>
+          <a:bodyPr wrap="none" anchor="t">
+            <a:spAutoFit/>
+          </a:bodyPr>
+          <a:lstStyle/>
+          <a:p>
+            <a:r>
+              <a:rPr lang="x-none" sz="2400" dirty="0"/>
+              <a:t>Link Utilization: 6/7 = 85.71%</a:t>
+            </a:r>
+            <a:endParaRPr lang="en-US" sz="2400" dirty="0"/>
+          </a:p>
+        </p:txBody>
+      </p:sp>
+      <p:pic>
+        <p:nvPicPr>
+          <p:cNvPr id="4" name="Picture 3"/>
+          <p:cNvPicPr>
+            <a:picLocks noChangeAspect="1"/>
+          </p:cNvPicPr>
+          <p:nvPr/>
+        </p:nvPicPr>
+        <p:blipFill>
+          <a:blip r:embed="rId4"/>
+          <a:stretch>
+            <a:fillRect/>
+          </a:stretch>
+        </p:blipFill>
+        <p:spPr>
+          <a:xfrm>
+            <a:off x="262926" y="3581400"/>
+            <a:ext cx="3853463" cy="2720431"/>
+          </a:xfrm>
+          <a:prstGeom prst="rect">
+            <a:avLst/>
+          </a:prstGeom>
+        </p:spPr>
+      </p:pic>
+      <p:pic>
+        <p:nvPicPr>
+          <p:cNvPr id="6" name="Picture 5"/>
+          <p:cNvPicPr>
+            <a:picLocks noChangeAspect="1"/>
+          </p:cNvPicPr>
+          <p:nvPr/>
+        </p:nvPicPr>
+        <p:blipFill>
+          <a:blip r:embed="rId5"/>
+          <a:stretch>
+            <a:fillRect/>
+          </a:stretch>
+        </p:blipFill>
+        <p:spPr>
+          <a:xfrm>
+            <a:off x="4876800" y="3657600"/>
+            <a:ext cx="3733024" cy="2644355"/>
+          </a:xfrm>
+          <a:prstGeom prst="rect">
+            <a:avLst/>
+          </a:prstGeom>
+        </p:spPr>
+      </p:pic>
+      <p:sp>
+        <p:nvSpPr>
+          <p:cNvPr id="57" name="TextBox 56"/>
+          <p:cNvSpPr txBox="1"/>
+          <p:nvPr/>
+        </p:nvSpPr>
+        <p:spPr>
+          <a:xfrm flipH="1">
+            <a:off x="4086225" y="3996055"/>
+            <a:ext cx="1166095" cy="1015663"/>
+          </a:xfrm>
+          <a:prstGeom prst="rect">
+            <a:avLst/>
+          </a:prstGeom>
+        </p:spPr>
+        <p:txBody>
+          <a:bodyPr wrap="square" anchor="t">
+            <a:spAutoFit/>
+          </a:bodyPr>
+          <a:lstStyle/>
+          <a:p>
+            <a:r>
+              <a:rPr lang="x-none" sz="6000" dirty="0"/>
+              <a:t>...</a:t>
+            </a:r>
+            <a:endParaRPr lang="en-US" sz="6000" dirty="0"/>
+          </a:p>
+        </p:txBody>
+      </p:sp>
+    </p:spTree>
+    <p:extLst>
+      <p:ext uri="{BB962C8B-B14F-4D97-AF65-F5344CB8AC3E}">
+        <p14:creationId xmlns:p14="http://schemas.microsoft.com/office/powerpoint/2010/main" val="1632952188"/>
+      </p:ext>
+    </p:extLst>
+  </p:cSld>
+  <p:clrMapOvr>
+    <a:masterClrMapping/>
+  </p:clrMapOvr>
+</p:sld>
+</file>
+
+<file path=ppt/slides/slide8.xml><?xml version="1.0" encoding="utf-8"?>
+<p:sld xmlns:a="http://schemas.openxmlformats.org/drawingml/2006/main" xmlns:r="http://schemas.openxmlformats.org/officeDocument/2006/relationships" xmlns:p="http://schemas.openxmlformats.org/presentationml/2006/main">
+  <p:cSld>
+    <p:spTree>
+      <p:nvGrpSpPr>
+        <p:cNvPr id="1" name=""/>
+        <p:cNvGrpSpPr/>
+        <p:nvPr/>
+      </p:nvGrpSpPr>
+      <p:grpSpPr>
+        <a:xfrm>
+          <a:off x="0" y="0"/>
+          <a:ext cx="0" cy="0"/>
+          <a:chOff x="0" y="0"/>
+          <a:chExt cx="0" cy="0"/>
+        </a:xfrm>
+      </p:grpSpPr>
+      <p:sp>
+        <p:nvSpPr>
           <p:cNvPr id="3" name="Content Placeholder 2"/>
           <p:cNvSpPr>
             <a:spLocks noGrp="1"/>
@@ -8387,31 +8472,31 @@
           <a:lstStyle/>
           <a:p>
             <a:r>
-              <a:rPr lang="EN-US" altLang="zh-CN" dirty="0"/>
+              <a:rPr lang="x-none" altLang="zh-CN" dirty="0"/>
               <a:t>User</a:t>
             </a:r>
             <a:r>
-              <a:rPr lang="ZH-CN" altLang="en-US" dirty="0"/>
+              <a:rPr lang="x-none" altLang="en-US" dirty="0"/>
               <a:t> </a:t>
             </a:r>
             <a:r>
-              <a:rPr lang="EN-US" altLang="zh-CN" dirty="0"/>
+              <a:rPr lang="x-none" altLang="zh-CN" dirty="0"/>
               <a:t>submits</a:t>
             </a:r>
             <a:r>
-              <a:rPr lang="ZH-CN" altLang="en-US" dirty="0"/>
+              <a:rPr lang="x-none" altLang="en-US" dirty="0"/>
               <a:t> </a:t>
             </a:r>
             <a:r>
-              <a:rPr lang="EN-US" altLang="zh-CN" dirty="0"/>
+              <a:rPr lang="x-none" altLang="zh-CN" dirty="0"/>
               <a:t>a</a:t>
             </a:r>
             <a:r>
-              <a:rPr lang="ZH-CN" altLang="en-US" dirty="0"/>
+              <a:rPr lang="x-none" altLang="en-US" dirty="0"/>
               <a:t> </a:t>
             </a:r>
             <a:r>
-              <a:rPr lang="EN-US" altLang="zh-CN" dirty="0"/>
+              <a:rPr lang="x-none" altLang="zh-CN" dirty="0"/>
               <a:t>request:</a:t>
             </a:r>
           </a:p>
@@ -8420,7 +8505,7 @@
               <a:buNone/>
             </a:pPr>
             <a:r>
-              <a:rPr lang="EN-US" altLang="zh-CN" dirty="0"/>
+              <a:rPr lang="x-none" altLang="zh-CN" dirty="0"/>
               <a:t>	{</a:t>
             </a:r>
           </a:p>
@@ -8429,23 +8514,23 @@
               <a:buNone/>
             </a:pPr>
             <a:r>
-              <a:rPr lang="EN-US" altLang="zh-CN" dirty="0"/>
+              <a:rPr lang="x-none" altLang="zh-CN" dirty="0"/>
               <a:t>		“</a:t>
             </a:r>
             <a:r>
-              <a:rPr lang="EN-US" altLang="ZH-CN" dirty="0"/>
+              <a:rPr lang="x-none" altLang="x-none" dirty="0"/>
               <a:t>DatasetName</a:t>
             </a:r>
             <a:r>
-              <a:rPr lang="EN-US" altLang="zh-CN" dirty="0"/>
+              <a:rPr lang="x-none" altLang="zh-CN" dirty="0"/>
               <a:t>”:</a:t>
             </a:r>
             <a:r>
-              <a:rPr lang="ZH-CN" altLang="en-US" dirty="0"/>
+              <a:rPr lang="x-none" altLang="en-US" dirty="0"/>
               <a:t> </a:t>
             </a:r>
             <a:r>
-              <a:rPr lang="EN-US" altLang="zh-CN" dirty="0"/>
+              <a:rPr lang="x-none" altLang="zh-CN" dirty="0"/>
               <a:t>“A”,</a:t>
             </a:r>
           </a:p>
@@ -8454,7 +8539,7 @@
               <a:buNone/>
             </a:pPr>
             <a:r>
-              <a:rPr lang="EN-US" altLang="ZH-CN" dirty="0"/>
+              <a:rPr lang="x-none" altLang="x-none" dirty="0"/>
               <a:t>	 	“Destination”: {“Site 2”, “Site 3”, “Site 4”, “Site 5”, “Site 6”, “Site 7”}</a:t>
             </a:r>
           </a:p>
@@ -8463,7 +8548,7 @@
               <a:buNone/>
             </a:pPr>
             <a:r>
-              <a:rPr lang="EN-US" altLang="zh-CN" dirty="0"/>
+              <a:rPr lang="x-none" altLang="zh-CN" dirty="0"/>
               <a:t>	}</a:t>
             </a:r>
           </a:p>
@@ -8473,7 +8558,7 @@
               <a:buChar char="•"/>
             </a:pPr>
             <a:r>
-              <a:rPr lang="EN-US" dirty="0"/>
+              <a:rPr lang="x-none" dirty="0"/>
               <a:t>ExaO receives this requests and makes online file-level scheduling decisions to maximize network utilization</a:t>
             </a:r>
           </a:p>
@@ -8483,15 +8568,15 @@
               <a:buChar char="•"/>
             </a:pPr>
             <a:r>
-              <a:rPr lang="EN-US" dirty="0"/>
+              <a:rPr lang="x-none" dirty="0"/>
               <a:t>Audience visualize the status of file transfers through </a:t>
             </a:r>
             <a:r>
-              <a:rPr lang="EN-US" dirty="0" err="1"/>
+              <a:rPr lang="x-none" dirty="0" err="1"/>
               <a:t>Monalisa</a:t>
             </a:r>
             <a:r>
-              <a:rPr lang="EN-US" dirty="0"/>
+              <a:rPr lang="x-none" dirty="0"/>
               <a:t> and high link utilization through testbed UI </a:t>
             </a:r>
           </a:p>

</xml_diff>